<commit_message>
slide fix to czpw talk
Spotted by lizmat++
</commit_message>
<xml_diff>
--- a/czpw-2014-pride-envy/talk.pptx
+++ b/czpw-2014-pride-envy/talk.pptx
@@ -4102,29 +4102,7 @@
                 <a:ea typeface="Malgun Gothic" panose="020B0503020000020004" pitchFamily="34" charset="-127"/>
                 <a:cs typeface="Microsoft Sans Serif" panose="020B0604020202020204" pitchFamily="34" charset="0"/>
               </a:rPr>
-              <a:t>But the </a:t>
-            </a:r>
-            <a:r>
-              <a:rPr lang="en-US" sz="4000" dirty="0" smtClean="0">
-                <a:solidFill>
-                  <a:schemeClr val="bg1"/>
-                </a:solidFill>
-                <a:latin typeface="Franklin Gothic Book" panose="020B0503020102020204" pitchFamily="34" charset="0"/>
-                <a:ea typeface="Malgun Gothic" panose="020B0503020000020004" pitchFamily="34" charset="-127"/>
-                <a:cs typeface="Microsoft Sans Serif" panose="020B0604020202020204" pitchFamily="34" charset="0"/>
-              </a:rPr>
-              <a:t>results are back: </a:t>
-            </a:r>
-            <a:r>
-              <a:rPr lang="en-US" sz="4000" dirty="0" smtClean="0">
-                <a:solidFill>
-                  <a:schemeClr val="bg1"/>
-                </a:solidFill>
-                <a:latin typeface="Franklin Gothic Book" panose="020B0503020102020204" pitchFamily="34" charset="0"/>
-                <a:ea typeface="Malgun Gothic" panose="020B0503020000020004" pitchFamily="34" charset="-127"/>
-                <a:cs typeface="Microsoft Sans Serif" panose="020B0604020202020204" pitchFamily="34" charset="0"/>
-              </a:rPr>
-              <a:t>the confusion isn’t worth the benefits.</a:t>
+              <a:t>But the results are back: the confusion isn’t worth the benefits.</a:t>
             </a:r>
           </a:p>
           <a:p>
@@ -4514,27 +4492,8 @@
                 <a:ea typeface="Malgun Gothic" panose="020B0503020000020004" pitchFamily="34" charset="-127"/>
                 <a:cs typeface="Microsoft Sans Serif" panose="020B0604020202020204" pitchFamily="34" charset="0"/>
               </a:rPr>
-              <a:t>It is. I’m proud of that</a:t>
-            </a:r>
-            <a:r>
-              <a:rPr lang="en-US" sz="4000" dirty="0" smtClean="0">
-                <a:solidFill>
-                  <a:schemeClr val="bg1"/>
-                </a:solidFill>
-                <a:latin typeface="Franklin Gothic Book" panose="020B0503020102020204" pitchFamily="34" charset="0"/>
-                <a:ea typeface="Malgun Gothic" panose="020B0503020000020004" pitchFamily="34" charset="-127"/>
-                <a:cs typeface="Microsoft Sans Serif" panose="020B0604020202020204" pitchFamily="34" charset="0"/>
-              </a:rPr>
-              <a:t>.</a:t>
-            </a:r>
-            <a:endParaRPr lang="en-US" sz="4000" dirty="0" smtClean="0">
-              <a:solidFill>
-                <a:schemeClr val="bg1"/>
-              </a:solidFill>
-              <a:latin typeface="Franklin Gothic Book" panose="020B0503020102020204" pitchFamily="34" charset="0"/>
-              <a:ea typeface="Malgun Gothic" panose="020B0503020000020004" pitchFamily="34" charset="-127"/>
-              <a:cs typeface="Microsoft Sans Serif" panose="020B0604020202020204" pitchFamily="34" charset="0"/>
-            </a:endParaRPr>
+              <a:t>It is. I’m proud of that.</a:t>
+            </a:r>
           </a:p>
         </p:txBody>
       </p:sp>
@@ -4594,15 +4553,7 @@
                 <a:ea typeface="Malgun Gothic" panose="020B0503020000020004" pitchFamily="34" charset="-127"/>
                 <a:cs typeface="Consolas" panose="020B0609020204030204" pitchFamily="49" charset="0"/>
               </a:rPr>
-              <a:t>sub postfix:&lt;!&gt;($n) { [*] 2..$n </a:t>
-            </a:r>
-            <a:r>
-              <a:rPr lang="en-US" sz="2400" dirty="0" smtClean="0">
-                <a:latin typeface="Consolas" panose="020B0609020204030204" pitchFamily="49" charset="0"/>
-                <a:ea typeface="Malgun Gothic" panose="020B0503020000020004" pitchFamily="34" charset="-127"/>
-                <a:cs typeface="Consolas" panose="020B0609020204030204" pitchFamily="49" charset="0"/>
-              </a:rPr>
-              <a:t>}</a:t>
+              <a:t>sub postfix:&lt;!&gt;($n) { [*] 2..$n }</a:t>
             </a:r>
           </a:p>
           <a:p>
@@ -4817,29 +4768,7 @@
                 <a:ea typeface="Malgun Gothic" panose="020B0503020000020004" pitchFamily="34" charset="-127"/>
                 <a:cs typeface="Microsoft Sans Serif" panose="020B0604020202020204" pitchFamily="34" charset="0"/>
               </a:rPr>
-              <a:t>We should treat more things like values and functions. Values parallelize well. Functions </a:t>
-            </a:r>
-            <a:r>
-              <a:rPr lang="en-US" sz="4000" dirty="0" smtClean="0">
-                <a:solidFill>
-                  <a:schemeClr val="bg1"/>
-                </a:solidFill>
-                <a:latin typeface="Franklin Gothic Book" panose="020B0503020102020204" pitchFamily="34" charset="0"/>
-                <a:ea typeface="Malgun Gothic" panose="020B0503020000020004" pitchFamily="34" charset="-127"/>
-                <a:cs typeface="Microsoft Sans Serif" panose="020B0604020202020204" pitchFamily="34" charset="0"/>
-              </a:rPr>
-              <a:t>compose and refactor </a:t>
-            </a:r>
-            <a:r>
-              <a:rPr lang="en-US" sz="4000" dirty="0" smtClean="0">
-                <a:solidFill>
-                  <a:schemeClr val="bg1"/>
-                </a:solidFill>
-                <a:latin typeface="Franklin Gothic Book" panose="020B0503020102020204" pitchFamily="34" charset="0"/>
-                <a:ea typeface="Malgun Gothic" panose="020B0503020000020004" pitchFamily="34" charset="-127"/>
-                <a:cs typeface="Microsoft Sans Serif" panose="020B0604020202020204" pitchFamily="34" charset="0"/>
-              </a:rPr>
-              <a:t>nicely.</a:t>
+              <a:t>We should treat more things like values and functions. Values parallelize well. Functions compose and refactor nicely.</a:t>
             </a:r>
             <a:endParaRPr lang="sv-SE" sz="4000" dirty="0" smtClean="0">
               <a:solidFill>
@@ -7321,18 +7250,7 @@
                 <a:ea typeface="Malgun Gothic" panose="020B0503020000020004" pitchFamily="34" charset="-127"/>
                 <a:cs typeface="Microsoft Sans Serif" panose="020B0604020202020204" pitchFamily="34" charset="0"/>
               </a:rPr>
-              <a:t> type</a:t>
-            </a:r>
-            <a:r>
-              <a:rPr lang="en-US" sz="4000" dirty="0" smtClean="0">
-                <a:solidFill>
-                  <a:schemeClr val="bg1"/>
-                </a:solidFill>
-                <a:latin typeface="Franklin Gothic Book" panose="020B0503020102020204" pitchFamily="34" charset="0"/>
-                <a:ea typeface="Malgun Gothic" panose="020B0503020000020004" pitchFamily="34" charset="-127"/>
-                <a:cs typeface="Microsoft Sans Serif" panose="020B0604020202020204" pitchFamily="34" charset="0"/>
-              </a:rPr>
-              <a:t>:</a:t>
+              <a:t> type:</a:t>
             </a:r>
           </a:p>
           <a:p>
@@ -7392,14 +7310,6 @@
               </a:rPr>
               <a:t> Programming. Everything is strung together.</a:t>
             </a:r>
-            <a:endParaRPr lang="en-US" sz="4000" dirty="0" smtClean="0">
-              <a:solidFill>
-                <a:schemeClr val="bg1"/>
-              </a:solidFill>
-              <a:latin typeface="Franklin Gothic Book" panose="020B0503020102020204" pitchFamily="34" charset="0"/>
-              <a:ea typeface="Malgun Gothic" panose="020B0503020000020004" pitchFamily="34" charset="-127"/>
-              <a:cs typeface="Microsoft Sans Serif" panose="020B0604020202020204" pitchFamily="34" charset="0"/>
-            </a:endParaRPr>
           </a:p>
         </p:txBody>
       </p:sp>
@@ -7842,29 +7752,7 @@
                 <a:ea typeface="Malgun Gothic" panose="020B0503020000020004" pitchFamily="34" charset="-127"/>
                 <a:cs typeface="Microsoft Sans Serif" panose="020B0604020202020204" pitchFamily="34" charset="0"/>
               </a:rPr>
-              <a:t>In Perl 6, they were integrated fully into the language, and they </a:t>
-            </a:r>
-            <a:r>
-              <a:rPr lang="en-US" sz="4000" dirty="0" smtClean="0">
-                <a:solidFill>
-                  <a:schemeClr val="bg1"/>
-                </a:solidFill>
-                <a:latin typeface="Franklin Gothic Book" panose="020B0503020102020204" pitchFamily="34" charset="0"/>
-                <a:ea typeface="Malgun Gothic" panose="020B0503020000020004" pitchFamily="34" charset="-127"/>
-                <a:cs typeface="Microsoft Sans Serif" panose="020B0604020202020204" pitchFamily="34" charset="0"/>
-              </a:rPr>
-              <a:t>underpin </a:t>
-            </a:r>
-            <a:r>
-              <a:rPr lang="en-US" sz="4000" dirty="0" smtClean="0">
-                <a:solidFill>
-                  <a:schemeClr val="bg1"/>
-                </a:solidFill>
-                <a:latin typeface="Franklin Gothic Book" panose="020B0503020102020204" pitchFamily="34" charset="0"/>
-                <a:ea typeface="Malgun Gothic" panose="020B0503020000020004" pitchFamily="34" charset="-127"/>
-                <a:cs typeface="Microsoft Sans Serif" panose="020B0604020202020204" pitchFamily="34" charset="0"/>
-              </a:rPr>
-              <a:t>everything in a very real sense.</a:t>
+              <a:t>In Perl 6, they were integrated fully into the language, and they underpin everything in a very real sense.</a:t>
             </a:r>
           </a:p>
         </p:txBody>
@@ -8011,14 +7899,6 @@
               </a:rPr>
               <a:t>Here’s a typical class:</a:t>
             </a:r>
-            <a:endParaRPr lang="en-US" sz="4000" dirty="0" smtClean="0">
-              <a:solidFill>
-                <a:schemeClr val="bg1"/>
-              </a:solidFill>
-              <a:latin typeface="Franklin Gothic Book" panose="020B0503020102020204" pitchFamily="34" charset="0"/>
-              <a:ea typeface="Malgun Gothic" panose="020B0503020000020004" pitchFamily="34" charset="-127"/>
-              <a:cs typeface="Microsoft Sans Serif" panose="020B0604020202020204" pitchFamily="34" charset="0"/>
-            </a:endParaRPr>
           </a:p>
         </p:txBody>
       </p:sp>
@@ -8492,14 +8372,6 @@
               </a:rPr>
               <a:t>Here’s a typical grammar:</a:t>
             </a:r>
-            <a:endParaRPr lang="en-US" sz="4000" dirty="0" smtClean="0">
-              <a:solidFill>
-                <a:schemeClr val="bg1"/>
-              </a:solidFill>
-              <a:latin typeface="Franklin Gothic Book" panose="020B0503020102020204" pitchFamily="34" charset="0"/>
-              <a:ea typeface="Malgun Gothic" panose="020B0503020000020004" pitchFamily="34" charset="-127"/>
-              <a:cs typeface="Microsoft Sans Serif" panose="020B0604020202020204" pitchFamily="34" charset="0"/>
-            </a:endParaRPr>
           </a:p>
         </p:txBody>
       </p:sp>
@@ -9107,14 +8979,6 @@
               </a:rPr>
               <a:t> additionally allows a trailing one.</a:t>
             </a:r>
-            <a:endParaRPr lang="en-US" sz="4000" dirty="0" smtClean="0">
-              <a:solidFill>
-                <a:schemeClr val="bg1"/>
-              </a:solidFill>
-              <a:latin typeface="Franklin Gothic Book" panose="020B0503020102020204" pitchFamily="34" charset="0"/>
-              <a:ea typeface="Malgun Gothic" panose="020B0503020000020004" pitchFamily="34" charset="-127"/>
-              <a:cs typeface="Microsoft Sans Serif" panose="020B0604020202020204" pitchFamily="34" charset="0"/>
-            </a:endParaRPr>
           </a:p>
         </p:txBody>
       </p:sp>
@@ -9415,14 +9279,6 @@
               </a:rPr>
               <a:t> does that.</a:t>
             </a:r>
-            <a:endParaRPr lang="en-US" sz="4000" dirty="0" smtClean="0">
-              <a:solidFill>
-                <a:schemeClr val="bg1"/>
-              </a:solidFill>
-              <a:latin typeface="Franklin Gothic Book" panose="020B0503020102020204" pitchFamily="34" charset="0"/>
-              <a:ea typeface="Malgun Gothic" panose="020B0503020000020004" pitchFamily="34" charset="-127"/>
-              <a:cs typeface="Microsoft Sans Serif" panose="020B0604020202020204" pitchFamily="34" charset="0"/>
-            </a:endParaRPr>
           </a:p>
         </p:txBody>
       </p:sp>
@@ -9701,38 +9557,223 @@
           </a:p>
           <a:p>
             <a:pPr algn="ctr"/>
-            <a:endParaRPr lang="sv-SE" sz="4000" dirty="0" smtClean="0">
-              <a:solidFill>
-                <a:schemeClr val="bg1"/>
-              </a:solidFill>
-              <a:latin typeface="Franklin Gothic Book" panose="020B0503020102020204" pitchFamily="34" charset="0"/>
-              <a:ea typeface="Malgun Gothic" panose="020B0503020000020004" pitchFamily="34" charset="-127"/>
-              <a:cs typeface="Microsoft Sans Serif" panose="020B0604020202020204" pitchFamily="34" charset="0"/>
-            </a:endParaRPr>
-          </a:p>
-          <a:p>
-            <a:pPr algn="ctr"/>
-            <a:r>
-              <a:rPr lang="en-US" sz="4000" dirty="0" smtClean="0">
-                <a:solidFill>
-                  <a:schemeClr val="bg1"/>
-                </a:solidFill>
-                <a:latin typeface="Franklin Gothic Book" panose="020B0503020102020204" pitchFamily="34" charset="0"/>
-                <a:ea typeface="Malgun Gothic" panose="020B0503020000020004" pitchFamily="34" charset="-127"/>
-                <a:cs typeface="Microsoft Sans Serif" panose="020B0604020202020204" pitchFamily="34" charset="0"/>
-              </a:rPr>
-              <a:t>I find these hard to live </a:t>
-            </a:r>
-            <a:r>
-              <a:rPr lang="en-US" sz="4000" dirty="0" smtClean="0">
-                <a:solidFill>
-                  <a:schemeClr val="bg1"/>
-                </a:solidFill>
-                <a:latin typeface="Franklin Gothic Book" panose="020B0503020102020204" pitchFamily="34" charset="0"/>
-                <a:ea typeface="Malgun Gothic" panose="020B0503020000020004" pitchFamily="34" charset="-127"/>
-                <a:cs typeface="Microsoft Sans Serif" panose="020B0604020202020204" pitchFamily="34" charset="0"/>
-              </a:rPr>
-              <a:t>nowadays.</a:t>
+            <a:r>
+              <a:rPr lang="en-US" sz="4000" dirty="0" smtClean="0">
+                <a:solidFill>
+                  <a:schemeClr val="bg1"/>
+                </a:solidFill>
+                <a:latin typeface="Franklin Gothic Book" panose="020B0503020102020204" pitchFamily="34" charset="0"/>
+                <a:ea typeface="Malgun Gothic" panose="020B0503020000020004" pitchFamily="34" charset="-127"/>
+                <a:cs typeface="Microsoft Sans Serif" panose="020B0604020202020204" pitchFamily="34" charset="0"/>
+              </a:rPr>
+              <a:t>I </a:t>
+            </a:r>
+            <a:r>
+              <a:rPr lang="en-US" sz="4000" dirty="0" smtClean="0">
+                <a:solidFill>
+                  <a:schemeClr val="bg1"/>
+                </a:solidFill>
+                <a:latin typeface="Franklin Gothic Book" panose="020B0503020102020204" pitchFamily="34" charset="0"/>
+                <a:ea typeface="Malgun Gothic" panose="020B0503020000020004" pitchFamily="34" charset="-127"/>
+                <a:cs typeface="Microsoft Sans Serif" panose="020B0604020202020204" pitchFamily="34" charset="0"/>
+              </a:rPr>
+              <a:t>find these hard to live </a:t>
+            </a:r>
+            <a:r>
+              <a:rPr lang="en-US" sz="4000" dirty="0" smtClean="0">
+                <a:solidFill>
+                  <a:schemeClr val="bg1"/>
+                </a:solidFill>
+                <a:latin typeface="Franklin Gothic Book" panose="020B0503020102020204" pitchFamily="34" charset="0"/>
+                <a:ea typeface="Malgun Gothic" panose="020B0503020000020004" pitchFamily="34" charset="-127"/>
+                <a:cs typeface="Microsoft Sans Serif" panose="020B0604020202020204" pitchFamily="34" charset="0"/>
+              </a:rPr>
+              <a:t>without nowadays</a:t>
+            </a:r>
+            <a:r>
+              <a:rPr lang="en-US" sz="4000" dirty="0" smtClean="0">
+                <a:solidFill>
+                  <a:schemeClr val="bg1"/>
+                </a:solidFill>
+                <a:latin typeface="Franklin Gothic Book" panose="020B0503020102020204" pitchFamily="34" charset="0"/>
+                <a:ea typeface="Malgun Gothic" panose="020B0503020000020004" pitchFamily="34" charset="-127"/>
+                <a:cs typeface="Microsoft Sans Serif" panose="020B0604020202020204" pitchFamily="34" charset="0"/>
+              </a:rPr>
+              <a:t>.</a:t>
+            </a:r>
+          </a:p>
+          <a:p>
+            <a:pPr algn="ctr"/>
+            <a:endParaRPr lang="en-US" sz="4000" dirty="0">
+              <a:solidFill>
+                <a:schemeClr val="bg1"/>
+              </a:solidFill>
+              <a:latin typeface="Franklin Gothic Book" panose="020B0503020102020204" pitchFamily="34" charset="0"/>
+              <a:ea typeface="Malgun Gothic" panose="020B0503020000020004" pitchFamily="34" charset="-127"/>
+              <a:cs typeface="Microsoft Sans Serif" panose="020B0604020202020204" pitchFamily="34" charset="0"/>
+            </a:endParaRPr>
+          </a:p>
+          <a:p>
+            <a:pPr lvl="1"/>
+            <a:r>
+              <a:rPr lang="en-US" sz="3200" dirty="0" smtClean="0">
+                <a:solidFill>
+                  <a:schemeClr val="bg1"/>
+                </a:solidFill>
+                <a:latin typeface="Consolas" panose="020B0609020204030204" pitchFamily="49" charset="0"/>
+                <a:ea typeface="Malgun Gothic" panose="020B0503020000020004" pitchFamily="34" charset="-127"/>
+                <a:cs typeface="Consolas" panose="020B0609020204030204" pitchFamily="49" charset="0"/>
+              </a:rPr>
+              <a:t>.pick($n)</a:t>
+            </a:r>
+            <a:r>
+              <a:rPr lang="en-US" sz="4000" dirty="0" smtClean="0">
+                <a:solidFill>
+                  <a:schemeClr val="bg1"/>
+                </a:solidFill>
+                <a:latin typeface="Franklin Gothic Book" panose="020B0503020102020204" pitchFamily="34" charset="0"/>
+                <a:ea typeface="Malgun Gothic" panose="020B0503020000020004" pitchFamily="34" charset="-127"/>
+                <a:cs typeface="Microsoft Sans Serif" panose="020B0604020202020204" pitchFamily="34" charset="0"/>
+              </a:rPr>
+              <a:t>	Like </a:t>
+            </a:r>
+            <a:r>
+              <a:rPr lang="en-US" sz="3200" dirty="0" smtClean="0">
+                <a:solidFill>
+                  <a:schemeClr val="bg1"/>
+                </a:solidFill>
+                <a:latin typeface="Consolas" panose="020B0609020204030204" pitchFamily="49" charset="0"/>
+                <a:ea typeface="Malgun Gothic" panose="020B0503020000020004" pitchFamily="34" charset="-127"/>
+                <a:cs typeface="Consolas" panose="020B0609020204030204" pitchFamily="49" charset="0"/>
+              </a:rPr>
+              <a:t>$n </a:t>
+            </a:r>
+            <a:r>
+              <a:rPr lang="en-US" sz="4000" dirty="0" smtClean="0">
+                <a:solidFill>
+                  <a:schemeClr val="bg1"/>
+                </a:solidFill>
+                <a:latin typeface="Franklin Gothic Book" panose="020B0503020102020204" pitchFamily="34" charset="0"/>
+                <a:ea typeface="Malgun Gothic" panose="020B0503020000020004" pitchFamily="34" charset="-127"/>
+                <a:cs typeface="Microsoft Sans Serif" panose="020B0604020202020204" pitchFamily="34" charset="0"/>
+              </a:rPr>
+              <a:t>things out of a hat</a:t>
+            </a:r>
+          </a:p>
+          <a:p>
+            <a:pPr lvl="1"/>
+            <a:r>
+              <a:rPr lang="en-US" sz="3200" dirty="0" smtClean="0">
+                <a:solidFill>
+                  <a:schemeClr val="bg1"/>
+                </a:solidFill>
+                <a:latin typeface="Consolas" panose="020B0609020204030204" pitchFamily="49" charset="0"/>
+                <a:ea typeface="Malgun Gothic" panose="020B0503020000020004" pitchFamily="34" charset="-127"/>
+                <a:cs typeface="Consolas" panose="020B0609020204030204" pitchFamily="49" charset="0"/>
+              </a:rPr>
+              <a:t>.roll($n)</a:t>
+            </a:r>
+            <a:r>
+              <a:rPr lang="en-US" sz="4000" dirty="0" smtClean="0">
+                <a:solidFill>
+                  <a:schemeClr val="bg1"/>
+                </a:solidFill>
+                <a:latin typeface="Franklin Gothic Book" panose="020B0503020102020204" pitchFamily="34" charset="0"/>
+                <a:ea typeface="Malgun Gothic" panose="020B0503020000020004" pitchFamily="34" charset="-127"/>
+                <a:cs typeface="Microsoft Sans Serif" panose="020B0604020202020204" pitchFamily="34" charset="0"/>
+              </a:rPr>
+              <a:t>	Like </a:t>
+            </a:r>
+            <a:r>
+              <a:rPr lang="en-US" sz="3200" dirty="0" smtClean="0">
+                <a:solidFill>
+                  <a:schemeClr val="bg1"/>
+                </a:solidFill>
+                <a:latin typeface="Consolas" panose="020B0609020204030204" pitchFamily="49" charset="0"/>
+                <a:ea typeface="Malgun Gothic" panose="020B0503020000020004" pitchFamily="34" charset="-127"/>
+                <a:cs typeface="Consolas" panose="020B0609020204030204" pitchFamily="49" charset="0"/>
+              </a:rPr>
+              <a:t>$n </a:t>
+            </a:r>
+            <a:r>
+              <a:rPr lang="en-US" sz="4000" dirty="0" smtClean="0">
+                <a:solidFill>
+                  <a:schemeClr val="bg1"/>
+                </a:solidFill>
+                <a:latin typeface="Franklin Gothic Book" panose="020B0503020102020204" pitchFamily="34" charset="0"/>
+                <a:ea typeface="Malgun Gothic" panose="020B0503020000020004" pitchFamily="34" charset="-127"/>
+                <a:cs typeface="Microsoft Sans Serif" panose="020B0604020202020204" pitchFamily="34" charset="0"/>
+              </a:rPr>
+              <a:t>dice</a:t>
+            </a:r>
+          </a:p>
+          <a:p>
+            <a:pPr lvl="1"/>
+            <a:r>
+              <a:rPr lang="en-US" sz="3200" dirty="0" smtClean="0">
+                <a:solidFill>
+                  <a:schemeClr val="bg1"/>
+                </a:solidFill>
+                <a:latin typeface="Consolas" panose="020B0609020204030204" pitchFamily="49" charset="0"/>
+                <a:ea typeface="Malgun Gothic" panose="020B0503020000020004" pitchFamily="34" charset="-127"/>
+                <a:cs typeface="Consolas" panose="020B0609020204030204" pitchFamily="49" charset="0"/>
+              </a:rPr>
+              <a:t>.</a:t>
+            </a:r>
+            <a:r>
+              <a:rPr lang="en-US" sz="3200" dirty="0" err="1" smtClean="0">
+                <a:solidFill>
+                  <a:schemeClr val="bg1"/>
+                </a:solidFill>
+                <a:latin typeface="Consolas" panose="020B0609020204030204" pitchFamily="49" charset="0"/>
+                <a:ea typeface="Malgun Gothic" panose="020B0503020000020004" pitchFamily="34" charset="-127"/>
+                <a:cs typeface="Consolas" panose="020B0609020204030204" pitchFamily="49" charset="0"/>
+              </a:rPr>
+              <a:t>uniq</a:t>
+            </a:r>
+            <a:r>
+              <a:rPr lang="en-US" sz="4000" dirty="0" smtClean="0">
+                <a:solidFill>
+                  <a:schemeClr val="bg1"/>
+                </a:solidFill>
+                <a:latin typeface="Franklin Gothic Book" panose="020B0503020102020204" pitchFamily="34" charset="0"/>
+                <a:ea typeface="Malgun Gothic" panose="020B0503020000020004" pitchFamily="34" charset="-127"/>
+                <a:cs typeface="Microsoft Sans Serif" panose="020B0604020202020204" pitchFamily="34" charset="0"/>
+              </a:rPr>
+              <a:t>	</a:t>
+            </a:r>
+            <a:r>
+              <a:rPr lang="en-US" sz="4000" dirty="0" smtClean="0">
+                <a:solidFill>
+                  <a:schemeClr val="bg1"/>
+                </a:solidFill>
+                <a:latin typeface="Franklin Gothic Book" panose="020B0503020102020204" pitchFamily="34" charset="0"/>
+                <a:ea typeface="Malgun Gothic" panose="020B0503020000020004" pitchFamily="34" charset="-127"/>
+                <a:cs typeface="Microsoft Sans Serif" panose="020B0604020202020204" pitchFamily="34" charset="0"/>
+              </a:rPr>
+              <a:t>	Keep </a:t>
+            </a:r>
+            <a:r>
+              <a:rPr lang="en-US" sz="4000" dirty="0" smtClean="0">
+                <a:solidFill>
+                  <a:schemeClr val="bg1"/>
+                </a:solidFill>
+                <a:latin typeface="Franklin Gothic Book" panose="020B0503020102020204" pitchFamily="34" charset="0"/>
+                <a:ea typeface="Malgun Gothic" panose="020B0503020000020004" pitchFamily="34" charset="-127"/>
+                <a:cs typeface="Microsoft Sans Serif" panose="020B0604020202020204" pitchFamily="34" charset="0"/>
+              </a:rPr>
+              <a:t>non-repeating </a:t>
+            </a:r>
+            <a:r>
+              <a:rPr lang="en-US" sz="4000" dirty="0" err="1" smtClean="0">
+                <a:solidFill>
+                  <a:schemeClr val="bg1"/>
+                </a:solidFill>
+                <a:latin typeface="Franklin Gothic Book" panose="020B0503020102020204" pitchFamily="34" charset="0"/>
+                <a:ea typeface="Malgun Gothic" panose="020B0503020000020004" pitchFamily="34" charset="-127"/>
+                <a:cs typeface="Microsoft Sans Serif" panose="020B0604020202020204" pitchFamily="34" charset="0"/>
+              </a:rPr>
+              <a:t>elems</a:t>
             </a:r>
             <a:endParaRPr lang="en-US" sz="4000" dirty="0" smtClean="0">
               <a:solidFill>
@@ -9744,17 +9785,6 @@
             </a:endParaRPr>
           </a:p>
           <a:p>
-            <a:pPr algn="ctr"/>
-            <a:endParaRPr lang="en-US" sz="4000" dirty="0">
-              <a:solidFill>
-                <a:schemeClr val="bg1"/>
-              </a:solidFill>
-              <a:latin typeface="Franklin Gothic Book" panose="020B0503020102020204" pitchFamily="34" charset="0"/>
-              <a:ea typeface="Malgun Gothic" panose="020B0503020000020004" pitchFamily="34" charset="-127"/>
-              <a:cs typeface="Microsoft Sans Serif" panose="020B0604020202020204" pitchFamily="34" charset="0"/>
-            </a:endParaRPr>
-          </a:p>
-          <a:p>
             <a:pPr lvl="1"/>
             <a:r>
               <a:rPr lang="en-US" sz="3200" dirty="0" smtClean="0">
@@ -9765,19 +9795,22 @@
                 <a:ea typeface="Malgun Gothic" panose="020B0503020000020004" pitchFamily="34" charset="-127"/>
                 <a:cs typeface="Consolas" panose="020B0609020204030204" pitchFamily="49" charset="0"/>
               </a:rPr>
-              <a:t>.pick($n)</a:t>
-            </a:r>
-            <a:r>
-              <a:rPr lang="en-US" sz="4000" dirty="0" smtClean="0">
-                <a:solidFill>
-                  <a:schemeClr val="bg1"/>
-                </a:solidFill>
-                <a:latin typeface="Franklin Gothic Book" panose="020B0503020102020204" pitchFamily="34" charset="0"/>
-                <a:ea typeface="Malgun Gothic" panose="020B0503020000020004" pitchFamily="34" charset="-127"/>
-                <a:cs typeface="Microsoft Sans Serif" panose="020B0604020202020204" pitchFamily="34" charset="0"/>
-              </a:rPr>
-              <a:t>	Like </a:t>
-            </a:r>
+              <a:t>.min/.max</a:t>
+            </a:r>
+            <a:r>
+              <a:rPr lang="en-US" sz="4000" dirty="0" smtClean="0">
+                <a:solidFill>
+                  <a:schemeClr val="bg1"/>
+                </a:solidFill>
+                <a:latin typeface="Franklin Gothic Book" panose="020B0503020102020204" pitchFamily="34" charset="0"/>
+                <a:ea typeface="Malgun Gothic" panose="020B0503020000020004" pitchFamily="34" charset="-127"/>
+                <a:cs typeface="Microsoft Sans Serif" panose="020B0604020202020204" pitchFamily="34" charset="0"/>
+              </a:rPr>
+              <a:t>	Get extreme values</a:t>
+            </a:r>
+          </a:p>
+          <a:p>
+            <a:pPr lvl="1"/>
             <a:r>
               <a:rPr lang="en-US" sz="3200" dirty="0" smtClean="0">
                 <a:solidFill>
@@ -9787,18 +9820,18 @@
                 <a:ea typeface="Malgun Gothic" panose="020B0503020000020004" pitchFamily="34" charset="-127"/>
                 <a:cs typeface="Consolas" panose="020B0609020204030204" pitchFamily="49" charset="0"/>
               </a:rPr>
-              <a:t>$n </a:t>
-            </a:r>
-            <a:r>
-              <a:rPr lang="en-US" sz="4000" dirty="0" smtClean="0">
-                <a:solidFill>
-                  <a:schemeClr val="bg1"/>
-                </a:solidFill>
-                <a:latin typeface="Franklin Gothic Book" panose="020B0503020102020204" pitchFamily="34" charset="0"/>
-                <a:ea typeface="Malgun Gothic" panose="020B0503020000020004" pitchFamily="34" charset="-127"/>
-                <a:cs typeface="Microsoft Sans Serif" panose="020B0604020202020204" pitchFamily="34" charset="0"/>
-              </a:rPr>
-              <a:t>things out of a hat</a:t>
+              <a:t>.classify</a:t>
+            </a:r>
+            <a:r>
+              <a:rPr lang="en-US" sz="4000" dirty="0" smtClean="0">
+                <a:solidFill>
+                  <a:schemeClr val="bg1"/>
+                </a:solidFill>
+                <a:latin typeface="Franklin Gothic Book" panose="020B0503020102020204" pitchFamily="34" charset="0"/>
+                <a:ea typeface="Malgun Gothic" panose="020B0503020000020004" pitchFamily="34" charset="-127"/>
+                <a:cs typeface="Microsoft Sans Serif" panose="020B0604020202020204" pitchFamily="34" charset="0"/>
+              </a:rPr>
+              <a:t>	Collect into bins</a:t>
             </a:r>
           </a:p>
           <a:p>
@@ -9812,158 +9845,6 @@
                 <a:ea typeface="Malgun Gothic" panose="020B0503020000020004" pitchFamily="34" charset="-127"/>
                 <a:cs typeface="Consolas" panose="020B0609020204030204" pitchFamily="49" charset="0"/>
               </a:rPr>
-              <a:t>.roll($n)</a:t>
-            </a:r>
-            <a:r>
-              <a:rPr lang="en-US" sz="4000" dirty="0" smtClean="0">
-                <a:solidFill>
-                  <a:schemeClr val="bg1"/>
-                </a:solidFill>
-                <a:latin typeface="Franklin Gothic Book" panose="020B0503020102020204" pitchFamily="34" charset="0"/>
-                <a:ea typeface="Malgun Gothic" panose="020B0503020000020004" pitchFamily="34" charset="-127"/>
-                <a:cs typeface="Microsoft Sans Serif" panose="020B0604020202020204" pitchFamily="34" charset="0"/>
-              </a:rPr>
-              <a:t>	Like </a:t>
-            </a:r>
-            <a:r>
-              <a:rPr lang="en-US" sz="3200" dirty="0" smtClean="0">
-                <a:solidFill>
-                  <a:schemeClr val="bg1"/>
-                </a:solidFill>
-                <a:latin typeface="Consolas" panose="020B0609020204030204" pitchFamily="49" charset="0"/>
-                <a:ea typeface="Malgun Gothic" panose="020B0503020000020004" pitchFamily="34" charset="-127"/>
-                <a:cs typeface="Consolas" panose="020B0609020204030204" pitchFamily="49" charset="0"/>
-              </a:rPr>
-              <a:t>$n </a:t>
-            </a:r>
-            <a:r>
-              <a:rPr lang="en-US" sz="4000" dirty="0" smtClean="0">
-                <a:solidFill>
-                  <a:schemeClr val="bg1"/>
-                </a:solidFill>
-                <a:latin typeface="Franklin Gothic Book" panose="020B0503020102020204" pitchFamily="34" charset="0"/>
-                <a:ea typeface="Malgun Gothic" panose="020B0503020000020004" pitchFamily="34" charset="-127"/>
-                <a:cs typeface="Microsoft Sans Serif" panose="020B0604020202020204" pitchFamily="34" charset="0"/>
-              </a:rPr>
-              <a:t>dice</a:t>
-            </a:r>
-          </a:p>
-          <a:p>
-            <a:pPr lvl="1"/>
-            <a:r>
-              <a:rPr lang="en-US" sz="3200" dirty="0" smtClean="0">
-                <a:solidFill>
-                  <a:schemeClr val="bg1"/>
-                </a:solidFill>
-                <a:latin typeface="Consolas" panose="020B0609020204030204" pitchFamily="49" charset="0"/>
-                <a:ea typeface="Malgun Gothic" panose="020B0503020000020004" pitchFamily="34" charset="-127"/>
-                <a:cs typeface="Consolas" panose="020B0609020204030204" pitchFamily="49" charset="0"/>
-              </a:rPr>
-              <a:t>.unique</a:t>
-            </a:r>
-            <a:r>
-              <a:rPr lang="en-US" sz="4000" dirty="0" smtClean="0">
-                <a:solidFill>
-                  <a:schemeClr val="bg1"/>
-                </a:solidFill>
-                <a:latin typeface="Franklin Gothic Book" panose="020B0503020102020204" pitchFamily="34" charset="0"/>
-                <a:ea typeface="Malgun Gothic" panose="020B0503020000020004" pitchFamily="34" charset="-127"/>
-                <a:cs typeface="Microsoft Sans Serif" panose="020B0604020202020204" pitchFamily="34" charset="0"/>
-              </a:rPr>
-              <a:t>	Keep non-repeating </a:t>
-            </a:r>
-            <a:r>
-              <a:rPr lang="en-US" sz="4000" dirty="0" err="1" smtClean="0">
-                <a:solidFill>
-                  <a:schemeClr val="bg1"/>
-                </a:solidFill>
-                <a:latin typeface="Franklin Gothic Book" panose="020B0503020102020204" pitchFamily="34" charset="0"/>
-                <a:ea typeface="Malgun Gothic" panose="020B0503020000020004" pitchFamily="34" charset="-127"/>
-                <a:cs typeface="Microsoft Sans Serif" panose="020B0604020202020204" pitchFamily="34" charset="0"/>
-              </a:rPr>
-              <a:t>elems</a:t>
-            </a:r>
-            <a:endParaRPr lang="en-US" sz="4000" dirty="0" smtClean="0">
-              <a:solidFill>
-                <a:schemeClr val="bg1"/>
-              </a:solidFill>
-              <a:latin typeface="Franklin Gothic Book" panose="020B0503020102020204" pitchFamily="34" charset="0"/>
-              <a:ea typeface="Malgun Gothic" panose="020B0503020000020004" pitchFamily="34" charset="-127"/>
-              <a:cs typeface="Microsoft Sans Serif" panose="020B0604020202020204" pitchFamily="34" charset="0"/>
-            </a:endParaRPr>
-          </a:p>
-          <a:p>
-            <a:pPr lvl="1"/>
-            <a:r>
-              <a:rPr lang="en-US" sz="3200" dirty="0" smtClean="0">
-                <a:solidFill>
-                  <a:schemeClr val="bg1"/>
-                </a:solidFill>
-                <a:latin typeface="Consolas" panose="020B0609020204030204" pitchFamily="49" charset="0"/>
-                <a:ea typeface="Malgun Gothic" panose="020B0503020000020004" pitchFamily="34" charset="-127"/>
-                <a:cs typeface="Consolas" panose="020B0609020204030204" pitchFamily="49" charset="0"/>
-              </a:rPr>
-              <a:t>.min/.max</a:t>
-            </a:r>
-            <a:r>
-              <a:rPr lang="en-US" sz="4000" dirty="0" smtClean="0">
-                <a:solidFill>
-                  <a:schemeClr val="bg1"/>
-                </a:solidFill>
-                <a:latin typeface="Franklin Gothic Book" panose="020B0503020102020204" pitchFamily="34" charset="0"/>
-                <a:ea typeface="Malgun Gothic" panose="020B0503020000020004" pitchFamily="34" charset="-127"/>
-                <a:cs typeface="Microsoft Sans Serif" panose="020B0604020202020204" pitchFamily="34" charset="0"/>
-              </a:rPr>
-              <a:t>	Get extreme values</a:t>
-            </a:r>
-          </a:p>
-          <a:p>
-            <a:pPr lvl="1"/>
-            <a:r>
-              <a:rPr lang="en-US" sz="3200" dirty="0" smtClean="0">
-                <a:solidFill>
-                  <a:schemeClr val="bg1"/>
-                </a:solidFill>
-                <a:latin typeface="Consolas" panose="020B0609020204030204" pitchFamily="49" charset="0"/>
-                <a:ea typeface="Malgun Gothic" panose="020B0503020000020004" pitchFamily="34" charset="-127"/>
-                <a:cs typeface="Consolas" panose="020B0609020204030204" pitchFamily="49" charset="0"/>
-              </a:rPr>
-              <a:t>.classify</a:t>
-            </a:r>
-            <a:r>
-              <a:rPr lang="en-US" sz="4000" dirty="0" smtClean="0">
-                <a:solidFill>
-                  <a:schemeClr val="bg1"/>
-                </a:solidFill>
-                <a:latin typeface="Franklin Gothic Book" panose="020B0503020102020204" pitchFamily="34" charset="0"/>
-                <a:ea typeface="Malgun Gothic" panose="020B0503020000020004" pitchFamily="34" charset="-127"/>
-                <a:cs typeface="Microsoft Sans Serif" panose="020B0604020202020204" pitchFamily="34" charset="0"/>
-              </a:rPr>
-              <a:t>	Collect into </a:t>
-            </a:r>
-            <a:r>
-              <a:rPr lang="en-US" sz="4000" dirty="0" smtClean="0">
-                <a:solidFill>
-                  <a:schemeClr val="bg1"/>
-                </a:solidFill>
-                <a:latin typeface="Franklin Gothic Book" panose="020B0503020102020204" pitchFamily="34" charset="0"/>
-                <a:ea typeface="Malgun Gothic" panose="020B0503020000020004" pitchFamily="34" charset="-127"/>
-                <a:cs typeface="Microsoft Sans Serif" panose="020B0604020202020204" pitchFamily="34" charset="0"/>
-              </a:rPr>
-              <a:t>bins</a:t>
-            </a:r>
-          </a:p>
-          <a:p>
-            <a:pPr lvl="1"/>
-            <a:r>
-              <a:rPr lang="en-US" sz="4000" dirty="0" smtClean="0">
-                <a:solidFill>
-                  <a:schemeClr val="bg1"/>
-                </a:solidFill>
-                <a:latin typeface="Consolas" panose="020B0609020204030204" pitchFamily="49" charset="0"/>
-                <a:ea typeface="Malgun Gothic" panose="020B0503020000020004" pitchFamily="34" charset="-127"/>
-                <a:cs typeface="Consolas" panose="020B0609020204030204" pitchFamily="49" charset="0"/>
-              </a:rPr>
               <a:t>.first</a:t>
             </a:r>
             <a:r>
@@ -9975,7 +9856,29 @@
                 <a:ea typeface="Malgun Gothic" panose="020B0503020000020004" pitchFamily="34" charset="-127"/>
                 <a:cs typeface="Microsoft Sans Serif" panose="020B0604020202020204" pitchFamily="34" charset="0"/>
               </a:rPr>
-              <a:t>	Find first matching value</a:t>
+              <a:t>	</a:t>
+            </a:r>
+            <a:r>
+              <a:rPr lang="en-US" sz="4000" dirty="0" smtClean="0">
+                <a:solidFill>
+                  <a:schemeClr val="bg1"/>
+                </a:solidFill>
+                <a:latin typeface="Franklin Gothic Book" panose="020B0503020102020204" pitchFamily="34" charset="0"/>
+                <a:ea typeface="Malgun Gothic" panose="020B0503020000020004" pitchFamily="34" charset="-127"/>
+                <a:cs typeface="Microsoft Sans Serif" panose="020B0604020202020204" pitchFamily="34" charset="0"/>
+              </a:rPr>
+              <a:t>	Find </a:t>
+            </a:r>
+            <a:r>
+              <a:rPr lang="en-US" sz="4000" dirty="0" smtClean="0">
+                <a:solidFill>
+                  <a:schemeClr val="bg1"/>
+                </a:solidFill>
+                <a:latin typeface="Franklin Gothic Book" panose="020B0503020102020204" pitchFamily="34" charset="0"/>
+                <a:ea typeface="Malgun Gothic" panose="020B0503020000020004" pitchFamily="34" charset="-127"/>
+                <a:cs typeface="Microsoft Sans Serif" panose="020B0604020202020204" pitchFamily="34" charset="0"/>
+              </a:rPr>
+              <a:t>first matching value</a:t>
             </a:r>
             <a:endParaRPr lang="sv-SE" sz="4000" dirty="0" smtClean="0">
               <a:solidFill>
@@ -10647,29 +10550,7 @@
                 <a:ea typeface="Malgun Gothic" panose="020B0503020000020004" pitchFamily="34" charset="-127"/>
                 <a:cs typeface="Microsoft Sans Serif" panose="020B0604020202020204" pitchFamily="34" charset="0"/>
               </a:rPr>
-              <a:t>. So we </a:t>
-            </a:r>
-            <a:r>
-              <a:rPr lang="en-US" sz="4000" dirty="0" smtClean="0">
-                <a:solidFill>
-                  <a:schemeClr val="bg1"/>
-                </a:solidFill>
-                <a:latin typeface="Franklin Gothic Book" panose="020B0503020102020204" pitchFamily="34" charset="0"/>
-                <a:ea typeface="Malgun Gothic" panose="020B0503020000020004" pitchFamily="34" charset="-127"/>
-                <a:cs typeface="Microsoft Sans Serif" panose="020B0604020202020204" pitchFamily="34" charset="0"/>
-              </a:rPr>
-              <a:t>need to emulate </a:t>
-            </a:r>
-            <a:r>
-              <a:rPr lang="en-US" sz="4000" dirty="0" smtClean="0">
-                <a:solidFill>
-                  <a:schemeClr val="bg1"/>
-                </a:solidFill>
-                <a:latin typeface="Franklin Gothic Book" panose="020B0503020102020204" pitchFamily="34" charset="0"/>
-                <a:ea typeface="Malgun Gothic" panose="020B0503020000020004" pitchFamily="34" charset="-127"/>
-                <a:cs typeface="Microsoft Sans Serif" panose="020B0604020202020204" pitchFamily="34" charset="0"/>
-              </a:rPr>
-              <a:t>it:</a:t>
+              <a:t>. So we need to emulate it:</a:t>
             </a:r>
             <a:endParaRPr lang="sv-SE" sz="4000" dirty="0" smtClean="0">
               <a:solidFill>
@@ -13641,27 +13522,8 @@
                 <a:ea typeface="Malgun Gothic" panose="020B0503020000020004" pitchFamily="34" charset="-127"/>
                 <a:cs typeface="Microsoft Sans Serif" panose="020B0604020202020204" pitchFamily="34" charset="0"/>
               </a:rPr>
-              <a:t>There’s something about Perl 6 that makes it very nice to </a:t>
-            </a:r>
-            <a:r>
-              <a:rPr lang="en-US" sz="4000" dirty="0" smtClean="0">
-                <a:solidFill>
-                  <a:schemeClr val="bg1"/>
-                </a:solidFill>
-                <a:latin typeface="Franklin Gothic Book" panose="020B0503020102020204" pitchFamily="34" charset="0"/>
-                <a:ea typeface="Malgun Gothic" panose="020B0503020000020004" pitchFamily="34" charset="-127"/>
-                <a:cs typeface="Microsoft Sans Serif" panose="020B0604020202020204" pitchFamily="34" charset="0"/>
-              </a:rPr>
-              <a:t>refactor programs in small incremental steps.</a:t>
-            </a:r>
-            <a:endParaRPr lang="en-US" sz="4000" dirty="0" smtClean="0">
-              <a:solidFill>
-                <a:schemeClr val="bg1"/>
-              </a:solidFill>
-              <a:latin typeface="Franklin Gothic Book" panose="020B0503020102020204" pitchFamily="34" charset="0"/>
-              <a:ea typeface="Malgun Gothic" panose="020B0503020000020004" pitchFamily="34" charset="-127"/>
-              <a:cs typeface="Microsoft Sans Serif" panose="020B0604020202020204" pitchFamily="34" charset="0"/>
-            </a:endParaRPr>
+              <a:t>There’s something about Perl 6 that makes it very nice to refactor programs in small incremental steps.</a:t>
+            </a:r>
           </a:p>
           <a:p>
             <a:pPr algn="ctr"/>
@@ -13685,29 +13547,7 @@
                 <a:ea typeface="Malgun Gothic" panose="020B0503020000020004" pitchFamily="34" charset="-127"/>
                 <a:cs typeface="Microsoft Sans Serif" panose="020B0604020202020204" pitchFamily="34" charset="0"/>
               </a:rPr>
-              <a:t>Perl 5 has that too, but not to the same extent. Somehow the features of Perl 6 conspire to make refactoring </a:t>
-            </a:r>
-            <a:r>
-              <a:rPr lang="en-US" sz="4000" dirty="0" smtClean="0">
-                <a:solidFill>
-                  <a:schemeClr val="bg1"/>
-                </a:solidFill>
-                <a:latin typeface="Franklin Gothic Book" panose="020B0503020102020204" pitchFamily="34" charset="0"/>
-                <a:ea typeface="Malgun Gothic" panose="020B0503020000020004" pitchFamily="34" charset="-127"/>
-                <a:cs typeface="Microsoft Sans Serif" panose="020B0604020202020204" pitchFamily="34" charset="0"/>
-              </a:rPr>
-              <a:t>an extra </a:t>
-            </a:r>
-            <a:r>
-              <a:rPr lang="en-US" sz="4000" dirty="0" smtClean="0">
-                <a:solidFill>
-                  <a:schemeClr val="bg1"/>
-                </a:solidFill>
-                <a:latin typeface="Franklin Gothic Book" panose="020B0503020102020204" pitchFamily="34" charset="0"/>
-                <a:ea typeface="Malgun Gothic" panose="020B0503020000020004" pitchFamily="34" charset="-127"/>
-                <a:cs typeface="Microsoft Sans Serif" panose="020B0604020202020204" pitchFamily="34" charset="0"/>
-              </a:rPr>
-              <a:t>pleasant experience.</a:t>
+              <a:t>Perl 5 has that too, but not to the same extent. Somehow the features of Perl 6 conspire to make refactoring an extra pleasant experience.</a:t>
             </a:r>
             <a:endParaRPr lang="sv-SE" sz="4000" dirty="0" smtClean="0">
               <a:solidFill>
@@ -14044,27 +13884,8 @@
                 <a:ea typeface="Malgun Gothic" panose="020B0503020000020004" pitchFamily="34" charset="-127"/>
                 <a:cs typeface="Microsoft Sans Serif" panose="020B0604020202020204" pitchFamily="34" charset="0"/>
               </a:rPr>
-              <a:t>It’s reasonable to expect Perl 6 to be not much slower (and sometimes faster) than Perl 5</a:t>
-            </a:r>
-            <a:r>
-              <a:rPr lang="en-US" sz="4000" dirty="0" smtClean="0">
-                <a:solidFill>
-                  <a:schemeClr val="bg1"/>
-                </a:solidFill>
-                <a:latin typeface="Franklin Gothic Book" panose="020B0503020102020204" pitchFamily="34" charset="0"/>
-                <a:ea typeface="Malgun Gothic" panose="020B0503020000020004" pitchFamily="34" charset="-127"/>
-                <a:cs typeface="Microsoft Sans Serif" panose="020B0604020202020204" pitchFamily="34" charset="0"/>
-              </a:rPr>
-              <a:t>... eventually.</a:t>
-            </a:r>
-            <a:endParaRPr lang="en-US" sz="4000" dirty="0" smtClean="0">
-              <a:solidFill>
-                <a:schemeClr val="bg1"/>
-              </a:solidFill>
-              <a:latin typeface="Franklin Gothic Book" panose="020B0503020102020204" pitchFamily="34" charset="0"/>
-              <a:ea typeface="Malgun Gothic" panose="020B0503020000020004" pitchFamily="34" charset="-127"/>
-              <a:cs typeface="Microsoft Sans Serif" panose="020B0604020202020204" pitchFamily="34" charset="0"/>
-            </a:endParaRPr>
+              <a:t>It’s reasonable to expect Perl 6 to be not much slower (and sometimes faster) than Perl 5... eventually.</a:t>
+            </a:r>
           </a:p>
         </p:txBody>
       </p:sp>
@@ -14497,27 +14318,8 @@
                 <a:ea typeface="Malgun Gothic" panose="020B0503020000020004" pitchFamily="34" charset="-127"/>
                 <a:cs typeface="Microsoft Sans Serif" panose="020B0604020202020204" pitchFamily="34" charset="0"/>
               </a:rPr>
-              <a:t>Someone needs to write it</a:t>
-            </a:r>
-            <a:r>
-              <a:rPr lang="en-US" sz="4000" dirty="0" smtClean="0">
-                <a:solidFill>
-                  <a:schemeClr val="bg1"/>
-                </a:solidFill>
-                <a:latin typeface="Franklin Gothic Book" panose="020B0503020102020204" pitchFamily="34" charset="0"/>
-                <a:ea typeface="Malgun Gothic" panose="020B0503020000020004" pitchFamily="34" charset="-127"/>
-                <a:cs typeface="Microsoft Sans Serif" panose="020B0604020202020204" pitchFamily="34" charset="0"/>
-              </a:rPr>
-              <a:t>.</a:t>
-            </a:r>
-            <a:endParaRPr lang="en-US" sz="4000" dirty="0" smtClean="0">
-              <a:solidFill>
-                <a:schemeClr val="bg1"/>
-              </a:solidFill>
-              <a:latin typeface="Franklin Gothic Book" panose="020B0503020102020204" pitchFamily="34" charset="0"/>
-              <a:ea typeface="Malgun Gothic" panose="020B0503020000020004" pitchFamily="34" charset="-127"/>
-              <a:cs typeface="Microsoft Sans Serif" panose="020B0604020202020204" pitchFamily="34" charset="0"/>
-            </a:endParaRPr>
+              <a:t>Someone needs to write it.</a:t>
+            </a:r>
           </a:p>
         </p:txBody>
       </p:sp>

</xml_diff>